<commit_message>
Clean up API 102 slides
</commit_message>
<xml_diff>
--- a/files/2022_API_102a_Section_01_answers_excerpt.pptx
+++ b/files/2022_API_102a_Section_01_answers_excerpt.pptx
@@ -289,7 +289,7 @@
           <a:p>
             <a:fld id="{A3C95BBE-2A10-47D6-BACA-C03E01FC3A96}" type="datetimeFigureOut">
               <a:rPr lang="en-US" smtClean="0"/>
-              <a:t>2/19/2023</a:t>
+              <a:t>3/13/2023</a:t>
             </a:fld>
             <a:endParaRPr lang="en-US"/>
           </a:p>
@@ -487,7 +487,7 @@
           <a:p>
             <a:fld id="{A3C95BBE-2A10-47D6-BACA-C03E01FC3A96}" type="datetimeFigureOut">
               <a:rPr lang="en-US" smtClean="0"/>
-              <a:t>2/19/2023</a:t>
+              <a:t>3/13/2023</a:t>
             </a:fld>
             <a:endParaRPr lang="en-US"/>
           </a:p>
@@ -695,7 +695,7 @@
           <a:p>
             <a:fld id="{A3C95BBE-2A10-47D6-BACA-C03E01FC3A96}" type="datetimeFigureOut">
               <a:rPr lang="en-US" smtClean="0"/>
-              <a:t>2/19/2023</a:t>
+              <a:t>3/13/2023</a:t>
             </a:fld>
             <a:endParaRPr lang="en-US"/>
           </a:p>
@@ -893,7 +893,7 @@
           <a:p>
             <a:fld id="{A3C95BBE-2A10-47D6-BACA-C03E01FC3A96}" type="datetimeFigureOut">
               <a:rPr lang="en-US" smtClean="0"/>
-              <a:t>2/19/2023</a:t>
+              <a:t>3/13/2023</a:t>
             </a:fld>
             <a:endParaRPr lang="en-US"/>
           </a:p>
@@ -1168,7 +1168,7 @@
           <a:p>
             <a:fld id="{A3C95BBE-2A10-47D6-BACA-C03E01FC3A96}" type="datetimeFigureOut">
               <a:rPr lang="en-US" smtClean="0"/>
-              <a:t>2/19/2023</a:t>
+              <a:t>3/13/2023</a:t>
             </a:fld>
             <a:endParaRPr lang="en-US"/>
           </a:p>
@@ -1433,7 +1433,7 @@
           <a:p>
             <a:fld id="{A3C95BBE-2A10-47D6-BACA-C03E01FC3A96}" type="datetimeFigureOut">
               <a:rPr lang="en-US" smtClean="0"/>
-              <a:t>2/19/2023</a:t>
+              <a:t>3/13/2023</a:t>
             </a:fld>
             <a:endParaRPr lang="en-US"/>
           </a:p>
@@ -1845,7 +1845,7 @@
           <a:p>
             <a:fld id="{A3C95BBE-2A10-47D6-BACA-C03E01FC3A96}" type="datetimeFigureOut">
               <a:rPr lang="en-US" smtClean="0"/>
-              <a:t>2/19/2023</a:t>
+              <a:t>3/13/2023</a:t>
             </a:fld>
             <a:endParaRPr lang="en-US"/>
           </a:p>
@@ -1986,7 +1986,7 @@
           <a:p>
             <a:fld id="{A3C95BBE-2A10-47D6-BACA-C03E01FC3A96}" type="datetimeFigureOut">
               <a:rPr lang="en-US" smtClean="0"/>
-              <a:t>2/19/2023</a:t>
+              <a:t>3/13/2023</a:t>
             </a:fld>
             <a:endParaRPr lang="en-US"/>
           </a:p>
@@ -2099,7 +2099,7 @@
           <a:p>
             <a:fld id="{A3C95BBE-2A10-47D6-BACA-C03E01FC3A96}" type="datetimeFigureOut">
               <a:rPr lang="en-US" smtClean="0"/>
-              <a:t>2/19/2023</a:t>
+              <a:t>3/13/2023</a:t>
             </a:fld>
             <a:endParaRPr lang="en-US"/>
           </a:p>
@@ -2410,7 +2410,7 @@
           <a:p>
             <a:fld id="{A3C95BBE-2A10-47D6-BACA-C03E01FC3A96}" type="datetimeFigureOut">
               <a:rPr lang="en-US" smtClean="0"/>
-              <a:t>2/19/2023</a:t>
+              <a:t>3/13/2023</a:t>
             </a:fld>
             <a:endParaRPr lang="en-US"/>
           </a:p>
@@ -2698,7 +2698,7 @@
           <a:p>
             <a:fld id="{A3C95BBE-2A10-47D6-BACA-C03E01FC3A96}" type="datetimeFigureOut">
               <a:rPr lang="en-US" smtClean="0"/>
-              <a:t>2/19/2023</a:t>
+              <a:t>3/13/2023</a:t>
             </a:fld>
             <a:endParaRPr lang="en-US"/>
           </a:p>
@@ -2939,7 +2939,7 @@
           <a:p>
             <a:fld id="{A3C95BBE-2A10-47D6-BACA-C03E01FC3A96}" type="datetimeFigureOut">
               <a:rPr lang="en-US" smtClean="0"/>
-              <a:t>2/19/2023</a:t>
+              <a:t>3/13/2023</a:t>
             </a:fld>
             <a:endParaRPr lang="en-US"/>
           </a:p>
@@ -4233,7 +4233,7 @@
         <p:spPr/>
         <p:txBody>
           <a:bodyPr vert="horz" lIns="91440" tIns="45720" rIns="91440" bIns="45720" rtlCol="0" anchor="t">
-            <a:normAutofit/>
+            <a:normAutofit lnSpcReduction="10000"/>
           </a:bodyPr>
           <a:lstStyle/>
           <a:p>
@@ -4250,7 +4250,121 @@
             </a:r>
           </a:p>
           <a:p>
-            <a:endParaRPr lang="en-US" dirty="0"/>
+            <a:r>
+              <a:rPr lang="en-US" dirty="0"/>
+              <a:t>The consequences of this are large. At the end of the month:</a:t>
+            </a:r>
+          </a:p>
+          <a:p>
+            <a:pPr lvl="1"/>
+            <a:r>
+              <a:rPr lang="en-US" dirty="0"/>
+              <a:t>Hospitalizations increase </a:t>
+            </a:r>
+            <a:r>
+              <a:rPr lang="en-US" sz="1800" dirty="0">
+                <a:solidFill>
+                  <a:schemeClr val="tx1">
+                    <a:lumMod val="50000"/>
+                    <a:lumOff val="50000"/>
+                  </a:schemeClr>
+                </a:solidFill>
+              </a:rPr>
+              <a:t>(</a:t>
+            </a:r>
+            <a:r>
+              <a:rPr lang="en-US" sz="1800" dirty="0" err="1">
+                <a:solidFill>
+                  <a:schemeClr val="tx1">
+                    <a:lumMod val="50000"/>
+                    <a:lumOff val="50000"/>
+                  </a:schemeClr>
+                </a:solidFill>
+              </a:rPr>
+              <a:t>Basu</a:t>
+            </a:r>
+            <a:r>
+              <a:rPr lang="en-US" sz="1800" dirty="0">
+                <a:solidFill>
+                  <a:schemeClr val="tx1">
+                    <a:lumMod val="50000"/>
+                    <a:lumOff val="50000"/>
+                  </a:schemeClr>
+                </a:solidFill>
+              </a:rPr>
+              <a:t> et al. 2017)</a:t>
+            </a:r>
+          </a:p>
+          <a:p>
+            <a:pPr lvl="1"/>
+            <a:r>
+              <a:rPr lang="en-US" dirty="0"/>
+              <a:t>Crime increases </a:t>
+            </a:r>
+            <a:r>
+              <a:rPr lang="en-US" sz="1800" dirty="0">
+                <a:solidFill>
+                  <a:schemeClr val="tx1">
+                    <a:lumMod val="50000"/>
+                    <a:lumOff val="50000"/>
+                  </a:schemeClr>
+                </a:solidFill>
+              </a:rPr>
+              <a:t>(</a:t>
+            </a:r>
+            <a:r>
+              <a:rPr lang="en-US" sz="1800" dirty="0" err="1">
+                <a:solidFill>
+                  <a:schemeClr val="tx1">
+                    <a:lumMod val="50000"/>
+                    <a:lumOff val="50000"/>
+                  </a:schemeClr>
+                </a:solidFill>
+              </a:rPr>
+              <a:t>Carr</a:t>
+            </a:r>
+            <a:r>
+              <a:rPr lang="en-US" sz="1800" dirty="0">
+                <a:solidFill>
+                  <a:schemeClr val="tx1">
+                    <a:lumMod val="50000"/>
+                    <a:lumOff val="50000"/>
+                  </a:schemeClr>
+                </a:solidFill>
+              </a:rPr>
+              <a:t> &amp; Packham 2019)</a:t>
+            </a:r>
+          </a:p>
+          <a:p>
+            <a:pPr lvl="1"/>
+            <a:r>
+              <a:rPr lang="en-US" dirty="0"/>
+              <a:t>Students perform worse on high-stakes tests, are less likely to attend college </a:t>
+            </a:r>
+            <a:r>
+              <a:rPr lang="en-US" sz="1800" dirty="0">
+                <a:solidFill>
+                  <a:schemeClr val="tx1">
+                    <a:lumMod val="50000"/>
+                    <a:lumOff val="50000"/>
+                  </a:schemeClr>
+                </a:solidFill>
+              </a:rPr>
+              <a:t>(Bond et al. 2022) </a:t>
+            </a:r>
+          </a:p>
+          <a:p>
+            <a:r>
+              <a:rPr lang="en-US" dirty="0">
+                <a:solidFill>
+                  <a:schemeClr val="tx1">
+                    <a:lumMod val="50000"/>
+                    <a:lumOff val="50000"/>
+                  </a:schemeClr>
+                </a:solidFill>
+              </a:rPr>
+              <a:t>(Benefit amounts may also be inadequate)</a:t>
+            </a:r>
           </a:p>
         </p:txBody>
       </p:sp>

</xml_diff>